<commit_message>
updating for the weeek
</commit_message>
<xml_diff>
--- a/teaching/expdes/old/lectures/week4.pptx
+++ b/teaching/expdes/old/lectures/week4.pptx
@@ -223,7 +223,7 @@
           <a:p>
             <a:fld id="{29D44EF5-F762-0549-B994-8B993D3419F2}" type="datetimeFigureOut">
               <a:rPr lang="en-US" smtClean="0"/>
-              <a:t>8/29/22</a:t>
+              <a:t>9/25/23</a:t>
             </a:fld>
             <a:endParaRPr lang="en-US"/>
           </a:p>
@@ -703,7 +703,7 @@
           <a:p>
             <a:fld id="{2B908699-CE29-634D-83B5-1061B2BD35A6}" type="datetimeFigureOut">
               <a:rPr lang="en-US" smtClean="0"/>
-              <a:t>8/29/22</a:t>
+              <a:t>9/25/23</a:t>
             </a:fld>
             <a:endParaRPr lang="en-US"/>
           </a:p>
@@ -871,7 +871,7 @@
           <a:p>
             <a:fld id="{2B908699-CE29-634D-83B5-1061B2BD35A6}" type="datetimeFigureOut">
               <a:rPr lang="en-US" smtClean="0"/>
-              <a:t>8/29/22</a:t>
+              <a:t>9/25/23</a:t>
             </a:fld>
             <a:endParaRPr lang="en-US"/>
           </a:p>
@@ -1049,7 +1049,7 @@
           <a:p>
             <a:fld id="{2B908699-CE29-634D-83B5-1061B2BD35A6}" type="datetimeFigureOut">
               <a:rPr lang="en-US" smtClean="0"/>
-              <a:t>8/29/22</a:t>
+              <a:t>9/25/23</a:t>
             </a:fld>
             <a:endParaRPr lang="en-US"/>
           </a:p>
@@ -1217,7 +1217,7 @@
           <a:p>
             <a:fld id="{2B908699-CE29-634D-83B5-1061B2BD35A6}" type="datetimeFigureOut">
               <a:rPr lang="en-US" smtClean="0"/>
-              <a:t>8/29/22</a:t>
+              <a:t>9/25/23</a:t>
             </a:fld>
             <a:endParaRPr lang="en-US"/>
           </a:p>
@@ -1462,7 +1462,7 @@
           <a:p>
             <a:fld id="{2B908699-CE29-634D-83B5-1061B2BD35A6}" type="datetimeFigureOut">
               <a:rPr lang="en-US" smtClean="0"/>
-              <a:t>8/29/22</a:t>
+              <a:t>9/25/23</a:t>
             </a:fld>
             <a:endParaRPr lang="en-US"/>
           </a:p>
@@ -1691,7 +1691,7 @@
           <a:p>
             <a:fld id="{2B908699-CE29-634D-83B5-1061B2BD35A6}" type="datetimeFigureOut">
               <a:rPr lang="en-US" smtClean="0"/>
-              <a:t>8/29/22</a:t>
+              <a:t>9/25/23</a:t>
             </a:fld>
             <a:endParaRPr lang="en-US"/>
           </a:p>
@@ -2055,7 +2055,7 @@
           <a:p>
             <a:fld id="{2B908699-CE29-634D-83B5-1061B2BD35A6}" type="datetimeFigureOut">
               <a:rPr lang="en-US" smtClean="0"/>
-              <a:t>8/29/22</a:t>
+              <a:t>9/25/23</a:t>
             </a:fld>
             <a:endParaRPr lang="en-US"/>
           </a:p>
@@ -2172,7 +2172,7 @@
           <a:p>
             <a:fld id="{2B908699-CE29-634D-83B5-1061B2BD35A6}" type="datetimeFigureOut">
               <a:rPr lang="en-US" smtClean="0"/>
-              <a:t>8/29/22</a:t>
+              <a:t>9/25/23</a:t>
             </a:fld>
             <a:endParaRPr lang="en-US"/>
           </a:p>
@@ -2267,7 +2267,7 @@
           <a:p>
             <a:fld id="{2B908699-CE29-634D-83B5-1061B2BD35A6}" type="datetimeFigureOut">
               <a:rPr lang="en-US" smtClean="0"/>
-              <a:t>8/29/22</a:t>
+              <a:t>9/25/23</a:t>
             </a:fld>
             <a:endParaRPr lang="en-US"/>
           </a:p>
@@ -2542,7 +2542,7 @@
           <a:p>
             <a:fld id="{2B908699-CE29-634D-83B5-1061B2BD35A6}" type="datetimeFigureOut">
               <a:rPr lang="en-US" smtClean="0"/>
-              <a:t>8/29/22</a:t>
+              <a:t>9/25/23</a:t>
             </a:fld>
             <a:endParaRPr lang="en-US"/>
           </a:p>
@@ -2794,7 +2794,7 @@
           <a:p>
             <a:fld id="{2B908699-CE29-634D-83B5-1061B2BD35A6}" type="datetimeFigureOut">
               <a:rPr lang="en-US" smtClean="0"/>
-              <a:t>8/29/22</a:t>
+              <a:t>9/25/23</a:t>
             </a:fld>
             <a:endParaRPr lang="en-US"/>
           </a:p>
@@ -3008,7 +3008,7 @@
           <a:p>
             <a:fld id="{2B908699-CE29-634D-83B5-1061B2BD35A6}" type="datetimeFigureOut">
               <a:rPr lang="en-US" smtClean="0"/>
-              <a:t>8/29/22</a:t>
+              <a:t>9/25/23</a:t>
             </a:fld>
             <a:endParaRPr lang="en-US"/>
           </a:p>
@@ -12465,7 +12465,7 @@
           <p:nvPr>
             <p:extLst>
               <p:ext uri="{D42A27DB-BD31-4B8C-83A1-F6EECF244321}">
-                <p14:modId xmlns:p14="http://schemas.microsoft.com/office/powerpoint/2010/main" val="1002326106"/>
+                <p14:modId xmlns:p14="http://schemas.microsoft.com/office/powerpoint/2010/main" val="233716064"/>
               </p:ext>
             </p:extLst>
           </p:nvPr>
@@ -12973,13 +12973,30 @@
                     <a:bodyPr/>
                     <a:lstStyle/>
                     <a:p>
+                      <a:pPr marL="0" marR="0" lvl="0" indent="0" algn="l" defTabSz="914400" rtl="0" eaLnBrk="1" fontAlgn="auto" latinLnBrk="0" hangingPunct="1">
+                        <a:lnSpc>
+                          <a:spcPct val="100000"/>
+                        </a:lnSpc>
+                        <a:spcBef>
+                          <a:spcPts val="0"/>
+                        </a:spcBef>
+                        <a:spcAft>
+                          <a:spcPts val="0"/>
+                        </a:spcAft>
+                        <a:buClrTx/>
+                        <a:buSzTx/>
+                        <a:buFontTx/>
+                        <a:buNone/>
+                        <a:tabLst/>
+                        <a:defRPr/>
+                      </a:pPr>
                       <a:r>
                         <a:rPr lang="en-US" dirty="0">
                           <a:solidFill>
                             <a:schemeClr val="tx1"/>
                           </a:solidFill>
                         </a:rPr>
-                        <a:t>Bayesian vs ML</a:t>
+                        <a:t>P-values</a:t>
                       </a:r>
                     </a:p>
                   </a:txBody>
@@ -13317,14 +13334,11 @@
                     <a:bodyPr/>
                     <a:lstStyle/>
                     <a:p>
-                      <a:r>
-                        <a:rPr lang="en-US" dirty="0">
-                          <a:solidFill>
-                            <a:schemeClr val="tx1"/>
-                          </a:solidFill>
-                        </a:rPr>
-                        <a:t>P-values</a:t>
-                      </a:r>
+                      <a:endParaRPr lang="en-US" dirty="0">
+                        <a:solidFill>
+                          <a:schemeClr val="tx1"/>
+                        </a:solidFill>
+                      </a:endParaRPr>
                     </a:p>
                   </a:txBody>
                   <a:tcPr>
@@ -13493,14 +13507,11 @@
                     <a:bodyPr/>
                     <a:lstStyle/>
                     <a:p>
-                      <a:r>
-                        <a:rPr lang="en-US" dirty="0">
-                          <a:solidFill>
-                            <a:schemeClr val="tx1"/>
-                          </a:solidFill>
-                        </a:rPr>
-                        <a:t>Replicates (bio/tech)</a:t>
-                      </a:r>
+                      <a:endParaRPr lang="en-US" dirty="0">
+                        <a:solidFill>
+                          <a:schemeClr val="tx1"/>
+                        </a:solidFill>
+                      </a:endParaRPr>
                     </a:p>
                   </a:txBody>
                   <a:tcPr>
@@ -13753,7 +13764,7 @@
                             <a:schemeClr val="tx1"/>
                           </a:solidFill>
                         </a:rPr>
-                        <a:t>arrows, lines, points, text, </a:t>
+                        <a:t>lines, points, text, </a:t>
                       </a:r>
                     </a:p>
                   </a:txBody>

</xml_diff>